<commit_message>
updating README and Presentation
</commit_message>
<xml_diff>
--- a/Presentation/Draft Change Forecast Presentation.pptx
+++ b/Presentation/Draft Change Forecast Presentation.pptx
@@ -16,7 +16,7 @@
     <p:sldId id="273" r:id="rId10"/>
     <p:sldId id="275" r:id="rId11"/>
     <p:sldId id="274" r:id="rId12"/>
-    <p:sldId id="276" r:id="rId13"/>
+    <p:sldId id="278" r:id="rId13"/>
   </p:sldIdLst>
   <p:sldSz cx="12192000" cy="6858000"/>
   <p:notesSz cx="6858000" cy="9144000"/>
@@ -1347,7 +1347,7 @@
             </a:lnSpc>
           </a:pPr>
           <a:r>
-            <a:rPr lang="en-US"/>
+            <a:rPr lang="en-US" dirty="0"/>
             <a:t>Questions</a:t>
           </a:r>
         </a:p>
@@ -2870,7 +2870,7 @@
             <a:buNone/>
           </a:pPr>
           <a:r>
-            <a:rPr lang="en-US" sz="1500" kern="1200"/>
+            <a:rPr lang="en-US" sz="1500" kern="1200" dirty="0"/>
             <a:t>Questions</a:t>
           </a:r>
         </a:p>
@@ -4306,7 +4306,7 @@
           <a:p>
             <a:fld id="{D0059409-0213-49F5-9FB1-5FD0277D82C4}" type="datetimeFigureOut">
               <a:rPr lang="en-US" smtClean="0"/>
-              <a:t>3/15/2021</a:t>
+              <a:t>3/16/2021</a:t>
             </a:fld>
             <a:endParaRPr lang="en-US"/>
           </a:p>
@@ -4476,7 +4476,7 @@
           <a:p>
             <a:fld id="{D0059409-0213-49F5-9FB1-5FD0277D82C4}" type="datetimeFigureOut">
               <a:rPr lang="en-US" smtClean="0"/>
-              <a:t>3/15/2021</a:t>
+              <a:t>3/16/2021</a:t>
             </a:fld>
             <a:endParaRPr lang="en-US"/>
           </a:p>
@@ -4699,7 +4699,7 @@
           <a:p>
             <a:fld id="{D0059409-0213-49F5-9FB1-5FD0277D82C4}" type="datetimeFigureOut">
               <a:rPr lang="en-US" smtClean="0"/>
-              <a:t>3/15/2021</a:t>
+              <a:t>3/16/2021</a:t>
             </a:fld>
             <a:endParaRPr lang="en-US"/>
           </a:p>
@@ -4879,7 +4879,7 @@
           <a:p>
             <a:fld id="{D0059409-0213-49F5-9FB1-5FD0277D82C4}" type="datetimeFigureOut">
               <a:rPr lang="en-US" smtClean="0"/>
-              <a:t>3/15/2021</a:t>
+              <a:t>3/16/2021</a:t>
             </a:fld>
             <a:endParaRPr lang="en-US"/>
           </a:p>
@@ -5185,7 +5185,7 @@
           <a:p>
             <a:fld id="{D0059409-0213-49F5-9FB1-5FD0277D82C4}" type="datetimeFigureOut">
               <a:rPr lang="en-US" smtClean="0"/>
-              <a:t>3/15/2021</a:t>
+              <a:t>3/16/2021</a:t>
             </a:fld>
             <a:endParaRPr lang="en-US"/>
           </a:p>
@@ -5489,7 +5489,7 @@
           <a:p>
             <a:fld id="{D0059409-0213-49F5-9FB1-5FD0277D82C4}" type="datetimeFigureOut">
               <a:rPr lang="en-US" smtClean="0"/>
-              <a:t>3/15/2021</a:t>
+              <a:t>3/16/2021</a:t>
             </a:fld>
             <a:endParaRPr lang="en-US"/>
           </a:p>
@@ -5911,7 +5911,7 @@
           <a:p>
             <a:fld id="{D0059409-0213-49F5-9FB1-5FD0277D82C4}" type="datetimeFigureOut">
               <a:rPr lang="en-US" smtClean="0"/>
-              <a:t>3/15/2021</a:t>
+              <a:t>3/16/2021</a:t>
             </a:fld>
             <a:endParaRPr lang="en-US"/>
           </a:p>
@@ -6029,7 +6029,7 @@
           <a:p>
             <a:fld id="{D0059409-0213-49F5-9FB1-5FD0277D82C4}" type="datetimeFigureOut">
               <a:rPr lang="en-US" smtClean="0"/>
-              <a:t>3/15/2021</a:t>
+              <a:t>3/16/2021</a:t>
             </a:fld>
             <a:endParaRPr lang="en-US"/>
           </a:p>
@@ -6124,7 +6124,7 @@
           <a:p>
             <a:fld id="{D0059409-0213-49F5-9FB1-5FD0277D82C4}" type="datetimeFigureOut">
               <a:rPr lang="en-US" smtClean="0"/>
-              <a:t>3/15/2021</a:t>
+              <a:t>3/16/2021</a:t>
             </a:fld>
             <a:endParaRPr lang="en-US"/>
           </a:p>
@@ -6397,7 +6397,7 @@
           <a:p>
             <a:fld id="{D0059409-0213-49F5-9FB1-5FD0277D82C4}" type="datetimeFigureOut">
               <a:rPr lang="en-US" smtClean="0"/>
-              <a:t>3/15/2021</a:t>
+              <a:t>3/16/2021</a:t>
             </a:fld>
             <a:endParaRPr lang="en-US"/>
           </a:p>
@@ -6662,7 +6662,7 @@
           <a:p>
             <a:fld id="{D0059409-0213-49F5-9FB1-5FD0277D82C4}" type="datetimeFigureOut">
               <a:rPr lang="en-US" smtClean="0"/>
-              <a:t>3/15/2021</a:t>
+              <a:t>3/16/2021</a:t>
             </a:fld>
             <a:endParaRPr lang="en-US"/>
           </a:p>
@@ -6911,7 +6911,7 @@
           <a:p>
             <a:fld id="{D0059409-0213-49F5-9FB1-5FD0277D82C4}" type="datetimeFigureOut">
               <a:rPr lang="en-US" smtClean="0"/>
-              <a:t>3/15/2021</a:t>
+              <a:t>3/16/2021</a:t>
             </a:fld>
             <a:endParaRPr lang="en-US"/>
           </a:p>
@@ -7776,9 +7776,12 @@
           <a:p>
             <a:pPr lvl="1"/>
             <a:r>
-              <a:rPr lang="en-US" dirty="0"/>
-              <a:t>LINK GOES HERE</a:t>
-            </a:r>
+              <a:rPr lang="en-US" u="sng" dirty="0">
+                <a:hlinkClick r:id="rId2"/>
+              </a:rPr>
+              <a:t>https://obscure-coast-18273.herokuapp.com/</a:t>
+            </a:r>
+            <a:endParaRPr lang="en-US" dirty="0"/>
           </a:p>
           <a:p>
             <a:r>
@@ -7790,7 +7793,7 @@
             <a:pPr lvl="1"/>
             <a:r>
               <a:rPr lang="en-US" dirty="0">
-                <a:hlinkClick r:id="rId2"/>
+                <a:hlinkClick r:id="rId3"/>
               </a:rPr>
               <a:t>https://github.com/gehanstedt/change-forecast</a:t>
             </a:r>
@@ -7888,6 +7891,14 @@
 <file path=ppt/slides/slide12.xml><?xml version="1.0" encoding="utf-8"?>
 <p:sld xmlns:a="http://schemas.openxmlformats.org/drawingml/2006/main" xmlns:r="http://schemas.openxmlformats.org/officeDocument/2006/relationships" xmlns:p="http://schemas.openxmlformats.org/presentationml/2006/main">
   <p:cSld>
+    <p:bg>
+      <p:bgPr>
+        <a:solidFill>
+          <a:schemeClr val="tx1"/>
+        </a:solidFill>
+        <a:effectLst/>
+      </p:bgPr>
+    </p:bg>
     <p:spTree>
       <p:nvGrpSpPr>
         <p:cNvPr id="1" name=""/>
@@ -7902,40 +7913,97 @@
           <a:chExt cx="0" cy="0"/>
         </a:xfrm>
       </p:grpSpPr>
+      <p:pic>
+        <p:nvPicPr>
+          <p:cNvPr id="2" name="Picture 1">
+            <a:extLst>
+              <a:ext uri="{FF2B5EF4-FFF2-40B4-BE49-F238E27FC236}">
+                <a16:creationId xmlns:a16="http://schemas.microsoft.com/office/drawing/2014/main" id="{9F22402F-0151-4C3E-8659-9B8A42B27572}"/>
+              </a:ext>
+            </a:extLst>
+          </p:cNvPr>
+          <p:cNvPicPr>
+            <a:picLocks noChangeAspect="1"/>
+          </p:cNvPicPr>
+          <p:nvPr/>
+        </p:nvPicPr>
+        <p:blipFill>
+          <a:blip r:embed="rId2"/>
+          <a:stretch>
+            <a:fillRect/>
+          </a:stretch>
+        </p:blipFill>
+        <p:spPr>
+          <a:xfrm>
+            <a:off x="9182502" y="666164"/>
+            <a:ext cx="2184935" cy="5767007"/>
+          </a:xfrm>
+          <a:prstGeom prst="rect">
+            <a:avLst/>
+          </a:prstGeom>
+        </p:spPr>
+      </p:pic>
       <p:sp>
         <p:nvSpPr>
-          <p:cNvPr id="2" name="Title 1"/>
-          <p:cNvSpPr>
-            <a:spLocks noGrp="1"/>
-          </p:cNvSpPr>
-          <p:nvPr>
-            <p:ph type="title"/>
-          </p:nvPr>
+          <p:cNvPr id="4" name="TextBox 3">
+            <a:extLst>
+              <a:ext uri="{FF2B5EF4-FFF2-40B4-BE49-F238E27FC236}">
+                <a16:creationId xmlns:a16="http://schemas.microsoft.com/office/drawing/2014/main" id="{A9D76D5F-5610-4A7F-AA7F-A1CB7F3E96DC}"/>
+              </a:ext>
+            </a:extLst>
+          </p:cNvPr>
+          <p:cNvSpPr txBox="1"/>
+          <p:nvPr/>
         </p:nvSpPr>
         <p:spPr>
           <a:xfrm>
-            <a:off x="85724" y="2219325"/>
-            <a:ext cx="12106275" cy="1181100"/>
+            <a:off x="508334" y="2304464"/>
+            <a:ext cx="8205537" cy="2862322"/>
           </a:xfrm>
+          <a:prstGeom prst="rect">
+            <a:avLst/>
+          </a:prstGeom>
+          <a:solidFill>
+            <a:schemeClr val="bg2"/>
+          </a:solidFill>
+          <a:ln>
+            <a:solidFill>
+              <a:schemeClr val="tx1"/>
+            </a:solidFill>
+          </a:ln>
         </p:spPr>
         <p:txBody>
-          <a:bodyPr vert="horz" lIns="91440" tIns="45720" rIns="91440" bIns="45720" rtlCol="0" anchor="b">
-            <a:normAutofit/>
+          <a:bodyPr wrap="square" rtlCol="0">
+            <a:spAutoFit/>
           </a:bodyPr>
           <a:lstStyle/>
           <a:p>
-            <a:pPr defTabSz="457200"/>
-            <a:r>
-              <a:rPr lang="en-US" sz="5400" dirty="0"/>
-              <a:t>Thank you!</a:t>
-            </a:r>
+            <a:pPr algn="ctr"/>
+            <a:endParaRPr lang="en-US" sz="6000" b="1" dirty="0"/>
+          </a:p>
+          <a:p>
+            <a:pPr algn="ctr"/>
+            <a:r>
+              <a:rPr lang="en-US" sz="6000" b="1" dirty="0">
+                <a:latin typeface="+mj-lt"/>
+              </a:rPr>
+              <a:t>Thank</a:t>
+            </a:r>
+            <a:r>
+              <a:rPr lang="en-US" sz="6000" b="1" dirty="0"/>
+              <a:t> You!</a:t>
+            </a:r>
+          </a:p>
+          <a:p>
+            <a:pPr algn="ctr"/>
+            <a:endParaRPr lang="en-US" sz="6000" b="1" dirty="0"/>
           </a:p>
         </p:txBody>
       </p:sp>
     </p:spTree>
     <p:extLst>
       <p:ext uri="{BB962C8B-B14F-4D97-AF65-F5344CB8AC3E}">
-        <p14:creationId xmlns:p14="http://schemas.microsoft.com/office/powerpoint/2010/main" val="3905042885"/>
+        <p14:creationId xmlns:p14="http://schemas.microsoft.com/office/powerpoint/2010/main" val="971838317"/>
       </p:ext>
     </p:extLst>
   </p:cSld>
@@ -8021,13 +8089,13 @@
             <p:ph idx="1"/>
             <p:extLst>
               <p:ext uri="{D42A27DB-BD31-4B8C-83A1-F6EECF244321}">
-                <p14:modId xmlns:p14="http://schemas.microsoft.com/office/powerpoint/2010/main" val="2227164322"/>
+                <p14:modId xmlns:p14="http://schemas.microsoft.com/office/powerpoint/2010/main" val="504309313"/>
               </p:ext>
             </p:extLst>
           </p:nvPr>
         </p:nvGraphicFramePr>
         <p:xfrm>
-          <a:off x="317803" y="1956566"/>
+          <a:off x="1202919" y="1946940"/>
           <a:ext cx="3724808" cy="4312118"/>
         </p:xfrm>
         <a:graphic>
@@ -8036,6 +8104,35 @@
           </a:graphicData>
         </a:graphic>
       </p:graphicFrame>
+      <p:pic>
+        <p:nvPicPr>
+          <p:cNvPr id="6" name="Picture 5">
+            <a:extLst>
+              <a:ext uri="{FF2B5EF4-FFF2-40B4-BE49-F238E27FC236}">
+                <a16:creationId xmlns:a16="http://schemas.microsoft.com/office/drawing/2014/main" id="{484FA9A7-AEA6-45CE-9282-7125D069AD13}"/>
+              </a:ext>
+            </a:extLst>
+          </p:cNvPr>
+          <p:cNvPicPr>
+            <a:picLocks noChangeAspect="1"/>
+          </p:cNvPicPr>
+          <p:nvPr/>
+        </p:nvPicPr>
+        <p:blipFill rotWithShape="1">
+          <a:blip r:embed="rId7"/>
+          <a:srcRect t="7365"/>
+          <a:stretch/>
+        </p:blipFill>
+        <p:spPr>
+          <a:xfrm>
+            <a:off x="6094959" y="1872576"/>
+            <a:ext cx="5132038" cy="4897004"/>
+          </a:xfrm>
+          <a:prstGeom prst="rect">
+            <a:avLst/>
+          </a:prstGeom>
+        </p:spPr>
+      </p:pic>
     </p:spTree>
     <p:extLst>
       <p:ext uri="{BB962C8B-B14F-4D97-AF65-F5344CB8AC3E}">
@@ -8106,51 +8203,70 @@
         </p:nvSpPr>
         <p:spPr>
           <a:xfrm>
-            <a:off x="1296652" y="2438400"/>
+            <a:off x="1133022" y="2034139"/>
             <a:ext cx="9598696" cy="3318936"/>
           </a:xfrm>
         </p:spPr>
         <p:txBody>
           <a:bodyPr>
-            <a:normAutofit fontScale="70000" lnSpcReduction="20000"/>
+            <a:noAutofit/>
           </a:bodyPr>
           <a:lstStyle/>
           <a:p>
-            <a:r>
-              <a:rPr lang="en-US" dirty="0"/>
+            <a:pPr>
+              <a:buFont typeface="Arial" panose="020B0604020202020204" pitchFamily="34" charset="0"/>
+              <a:buChar char="•"/>
+            </a:pPr>
+            <a:r>
+              <a:rPr lang="en-US" sz="2000" dirty="0"/>
               <a:t>You are responsible for infrastructure stability and you need a quick way to view   upcoming major change activity</a:t>
             </a:r>
           </a:p>
           <a:p>
-            <a:r>
-              <a:rPr lang="en-US" dirty="0"/>
+            <a:pPr>
+              <a:buFont typeface="Arial" panose="020B0604020202020204" pitchFamily="34" charset="0"/>
+              <a:buChar char="•"/>
+            </a:pPr>
+            <a:r>
+              <a:rPr lang="en-US" sz="2000" dirty="0"/>
               <a:t>The answer is Change Forecast</a:t>
             </a:r>
           </a:p>
           <a:p>
-            <a:pPr lvl="1"/>
+            <a:pPr lvl="1">
+              <a:buFont typeface="Arial" panose="020B0604020202020204" pitchFamily="34" charset="0"/>
+              <a:buChar char="•"/>
+            </a:pPr>
             <a:r>
               <a:rPr lang="en-US" dirty="0"/>
               <a:t>Provides a consolidated view of change data and graphical views</a:t>
             </a:r>
           </a:p>
           <a:p>
-            <a:r>
-              <a:rPr lang="en-US" dirty="0"/>
-              <a:t>Provides seven day forecast using weather </a:t>
-            </a:r>
-          </a:p>
-          <a:p>
-            <a:r>
-              <a:rPr lang="en-US" dirty="0"/>
-              <a:t>Provides data based on current day, week,  and one month</a:t>
-            </a:r>
-          </a:p>
-          <a:p>
-            <a:endParaRPr lang="en-US" dirty="0"/>
-          </a:p>
-          <a:p>
-            <a:endParaRPr lang="en-US" dirty="0"/>
+            <a:pPr>
+              <a:buFont typeface="Arial" panose="020B0604020202020204" pitchFamily="34" charset="0"/>
+              <a:buChar char="•"/>
+            </a:pPr>
+            <a:r>
+              <a:rPr lang="en-US" sz="2000" dirty="0"/>
+              <a:t>Provides seven-day forecast using weather </a:t>
+            </a:r>
+          </a:p>
+          <a:p>
+            <a:pPr>
+              <a:buFont typeface="Arial" panose="020B0604020202020204" pitchFamily="34" charset="0"/>
+              <a:buChar char="•"/>
+            </a:pPr>
+            <a:r>
+              <a:rPr lang="en-US" sz="2000" dirty="0"/>
+              <a:t>Provides data based on current day, week, and 30 days</a:t>
+            </a:r>
+          </a:p>
+          <a:p>
+            <a:endParaRPr lang="en-US" sz="2000" dirty="0"/>
+          </a:p>
+          <a:p>
+            <a:endParaRPr lang="en-US" sz="2000" dirty="0"/>
           </a:p>
           <a:p>
             <a:pPr lvl="1"/>
@@ -8291,7 +8407,7 @@
             <a:pPr lvl="1"/>
             <a:r>
               <a:rPr lang="en-US" sz="1800" dirty="0"/>
-              <a:t>A user enters change requests into the database and is provided with the option of viewing the change forecast,  dashboard view of changes, or raw change data report.</a:t>
+              <a:t>From an existing database within the company environment, change requests have been entered through a series of internal processes. The user has the ability to access  that data in a graphical view. The user is provided with the option of viewing the change forecast,  dashboard view of changes, or raw change data report.</a:t>
             </a:r>
           </a:p>
           <a:p>
@@ -8433,8 +8549,8 @@
           </a:p>
           <a:p>
             <a:pPr lvl="1">
-              <a:buFont typeface="Courier New" panose="02070309020205020404" pitchFamily="49" charset="0"/>
-              <a:buChar char="o"/>
+              <a:buFont typeface="Arial" panose="020B0604020202020204" pitchFamily="34" charset="0"/>
+              <a:buChar char="•"/>
             </a:pPr>
             <a:r>
               <a:rPr lang="en-US" dirty="0"/>
@@ -8443,8 +8559,8 @@
           </a:p>
           <a:p>
             <a:pPr lvl="1">
-              <a:buFont typeface="Courier New" panose="02070309020205020404" pitchFamily="49" charset="0"/>
-              <a:buChar char="o"/>
+              <a:buFont typeface="Arial" panose="020B0604020202020204" pitchFamily="34" charset="0"/>
+              <a:buChar char="•"/>
             </a:pPr>
             <a:r>
               <a:rPr lang="en-US" dirty="0" err="1"/>
@@ -8454,8 +8570,8 @@
           </a:p>
           <a:p>
             <a:pPr lvl="1">
-              <a:buFont typeface="Courier New" panose="02070309020205020404" pitchFamily="49" charset="0"/>
-              <a:buChar char="o"/>
+              <a:buFont typeface="Arial" panose="020B0604020202020204" pitchFamily="34" charset="0"/>
+              <a:buChar char="•"/>
             </a:pPr>
             <a:r>
               <a:rPr lang="en-US" dirty="0" err="1"/>
@@ -8465,8 +8581,8 @@
           </a:p>
           <a:p>
             <a:pPr lvl="1">
-              <a:buFont typeface="Courier New" panose="02070309020205020404" pitchFamily="49" charset="0"/>
-              <a:buChar char="o"/>
+              <a:buFont typeface="Arial" panose="020B0604020202020204" pitchFamily="34" charset="0"/>
+              <a:buChar char="•"/>
             </a:pPr>
             <a:r>
               <a:rPr lang="en-US" b="1" i="1" dirty="0"/>
@@ -8475,8 +8591,8 @@
           </a:p>
           <a:p>
             <a:pPr lvl="1">
-              <a:buFont typeface="Courier New" panose="02070309020205020404" pitchFamily="49" charset="0"/>
-              <a:buChar char="o"/>
+              <a:buFont typeface="Arial" panose="020B0604020202020204" pitchFamily="34" charset="0"/>
+              <a:buChar char="•"/>
             </a:pPr>
             <a:r>
               <a:rPr lang="en-US" dirty="0"/>
@@ -8485,8 +8601,8 @@
           </a:p>
           <a:p>
             <a:pPr lvl="1">
-              <a:buFont typeface="Courier New" panose="02070309020205020404" pitchFamily="49" charset="0"/>
-              <a:buChar char="o"/>
+              <a:buFont typeface="Arial" panose="020B0604020202020204" pitchFamily="34" charset="0"/>
+              <a:buChar char="•"/>
             </a:pPr>
             <a:r>
               <a:rPr lang="en-US" dirty="0"/>
@@ -8495,8 +8611,8 @@
           </a:p>
           <a:p>
             <a:pPr lvl="1">
-              <a:buFont typeface="Courier New" panose="02070309020205020404" pitchFamily="49" charset="0"/>
-              <a:buChar char="o"/>
+              <a:buFont typeface="Arial" panose="020B0604020202020204" pitchFamily="34" charset="0"/>
+              <a:buChar char="•"/>
             </a:pPr>
             <a:r>
               <a:rPr lang="en-US" dirty="0" err="1"/>
@@ -8509,8 +8625,8 @@
           </a:p>
           <a:p>
             <a:pPr lvl="1">
-              <a:buFont typeface="Courier New" panose="02070309020205020404" pitchFamily="49" charset="0"/>
-              <a:buChar char="o"/>
+              <a:buFont typeface="Arial" panose="020B0604020202020204" pitchFamily="34" charset="0"/>
+              <a:buChar char="•"/>
             </a:pPr>
             <a:r>
               <a:rPr lang="en-US" b="1" i="1" dirty="0" err="1"/>
@@ -8523,8 +8639,8 @@
           </a:p>
           <a:p>
             <a:pPr lvl="1">
-              <a:buFont typeface="Courier New" panose="02070309020205020404" pitchFamily="49" charset="0"/>
-              <a:buChar char="o"/>
+              <a:buFont typeface="Arial" panose="020B0604020202020204" pitchFamily="34" charset="0"/>
+              <a:buChar char="•"/>
             </a:pPr>
             <a:r>
               <a:rPr lang="en-US" b="1" i="1" dirty="0"/>
@@ -8541,8 +8657,8 @@
           </a:p>
           <a:p>
             <a:pPr lvl="1">
-              <a:buFont typeface="Courier New" panose="02070309020205020404" pitchFamily="49" charset="0"/>
-              <a:buChar char="o"/>
+              <a:buFont typeface="Arial" panose="020B0604020202020204" pitchFamily="34" charset="0"/>
+              <a:buChar char="•"/>
             </a:pPr>
             <a:r>
               <a:rPr lang="en-US" sz="2000" dirty="0"/>
@@ -8551,8 +8667,8 @@
           </a:p>
           <a:p>
             <a:pPr lvl="1">
-              <a:buFont typeface="Courier New" panose="02070309020205020404" pitchFamily="49" charset="0"/>
-              <a:buChar char="o"/>
+              <a:buFont typeface="Arial" panose="020B0604020202020204" pitchFamily="34" charset="0"/>
+              <a:buChar char="•"/>
             </a:pPr>
             <a:r>
               <a:rPr lang="en-US" sz="2000" dirty="0"/>
@@ -8561,8 +8677,8 @@
           </a:p>
           <a:p>
             <a:pPr lvl="1">
-              <a:buFont typeface="Courier New" panose="02070309020205020404" pitchFamily="49" charset="0"/>
-              <a:buChar char="o"/>
+              <a:buFont typeface="Arial" panose="020B0604020202020204" pitchFamily="34" charset="0"/>
+              <a:buChar char="•"/>
             </a:pPr>
             <a:r>
               <a:rPr lang="en-US" sz="2000" dirty="0"/>
@@ -8571,8 +8687,8 @@
           </a:p>
           <a:p>
             <a:pPr lvl="1">
-              <a:buFont typeface="Courier New" panose="02070309020205020404" pitchFamily="49" charset="0"/>
-              <a:buChar char="o"/>
+              <a:buFont typeface="Arial" panose="020B0604020202020204" pitchFamily="34" charset="0"/>
+              <a:buChar char="•"/>
             </a:pPr>
             <a:r>
               <a:rPr lang="en-US" dirty="0"/>
@@ -8948,7 +9064,7 @@
           <a:lstStyle/>
           <a:p>
             <a:r>
-              <a:rPr lang="en-US" dirty="0"/>
+              <a:rPr lang="en-US" sz="2000" dirty="0"/>
               <a:t>Breakdown of Tasks / Roles</a:t>
             </a:r>
           </a:p>
@@ -8970,7 +9086,7 @@
             <a:pPr lvl="1"/>
             <a:r>
               <a:rPr lang="en-US" dirty="0"/>
-              <a:t>Issue Tracking and Tasks:  Donna</a:t>
+              <a:t>Issue Tracking and Tasks:  Donna, Greg </a:t>
             </a:r>
           </a:p>
           <a:p>
@@ -9075,146 +9191,142 @@
           </a:bodyPr>
           <a:lstStyle/>
           <a:p>
-            <a:r>
-              <a:rPr lang="en-US" sz="2000" dirty="0"/>
-              <a:t>Challenges</a:t>
-            </a:r>
-          </a:p>
-          <a:p>
-            <a:pPr lvl="1">
-              <a:buFont typeface="Courier New" panose="02070309020205020404" pitchFamily="49" charset="0"/>
-              <a:buChar char="o"/>
-            </a:pPr>
-            <a:r>
-              <a:rPr lang="en-US" dirty="0"/>
-              <a:t>Authentication for login page</a:t>
-            </a:r>
-            <a:endParaRPr lang="en-US" sz="2000" dirty="0"/>
-          </a:p>
-          <a:p>
-            <a:pPr lvl="1">
-              <a:buFont typeface="Courier New" panose="02070309020205020404" pitchFamily="49" charset="0"/>
-              <a:buChar char="o"/>
-            </a:pPr>
-            <a:r>
-              <a:rPr lang="en-US" dirty="0"/>
-              <a:t>Seed data is needed for an array of objects to make sure React has something to render when it loads</a:t>
-            </a:r>
-          </a:p>
-          <a:p>
-            <a:pPr lvl="1">
-              <a:buFont typeface="Courier New" panose="02070309020205020404" pitchFamily="49" charset="0"/>
-              <a:buChar char="o"/>
-            </a:pPr>
-            <a:r>
-              <a:rPr lang="en-US" dirty="0"/>
-              <a:t>Parameter management in React</a:t>
-            </a:r>
-            <a:endParaRPr lang="en-US" sz="2000" dirty="0"/>
-          </a:p>
-          <a:p>
-            <a:pPr lvl="1">
-              <a:buFont typeface="Courier New" panose="02070309020205020404" pitchFamily="49" charset="0"/>
-              <a:buChar char="o"/>
-            </a:pPr>
-            <a:endParaRPr lang="en-US" sz="2000" dirty="0"/>
-          </a:p>
-          <a:p>
-            <a:r>
-              <a:rPr lang="en-US" sz="2000" dirty="0"/>
-              <a:t>Successes</a:t>
-            </a:r>
-          </a:p>
-          <a:p>
-            <a:pPr lvl="1">
-              <a:buFont typeface="Courier New" panose="02070309020205020404" pitchFamily="49" charset="0"/>
-              <a:buChar char="o"/>
-            </a:pPr>
-            <a:r>
-              <a:rPr lang="en-US" sz="2000" dirty="0"/>
-              <a:t>Great teamwork</a:t>
-            </a:r>
-            <a:r>
-              <a:rPr lang="en-US" dirty="0"/>
-              <a:t> e</a:t>
-            </a:r>
-            <a:r>
-              <a:rPr lang="en-US" sz="2000" dirty="0"/>
-              <a:t>veryone contributed well </a:t>
-            </a:r>
-          </a:p>
-          <a:p>
-            <a:pPr lvl="1">
-              <a:buFont typeface="Courier New" panose="02070309020205020404" pitchFamily="49" charset="0"/>
-              <a:buChar char="o"/>
-            </a:pPr>
-            <a:r>
-              <a:rPr lang="en-US" dirty="0"/>
-              <a:t>G</a:t>
-            </a:r>
-            <a:r>
-              <a:rPr lang="en-US" sz="2000" dirty="0"/>
-              <a:t>reat communication</a:t>
-            </a:r>
-          </a:p>
-          <a:p>
-            <a:pPr lvl="1">
-              <a:buFont typeface="Courier New" panose="02070309020205020404" pitchFamily="49" charset="0"/>
-              <a:buChar char="o"/>
-            </a:pPr>
-            <a:r>
-              <a:rPr lang="en-US" sz="2000" dirty="0"/>
-              <a:t>Productive project meetings</a:t>
-            </a:r>
-          </a:p>
-          <a:p>
-            <a:pPr lvl="2">
-              <a:buFont typeface="Wingdings" panose="05000000000000000000" pitchFamily="2" charset="2"/>
-              <a:buChar char="Ø"/>
-            </a:pPr>
-            <a:r>
-              <a:rPr lang="en-US" dirty="0"/>
-              <a:t>Scrum meeting earlier in the day, followed by a working meeting in the evening </a:t>
-            </a:r>
-          </a:p>
-          <a:p>
-            <a:pPr lvl="2">
-              <a:buFont typeface="Wingdings" panose="05000000000000000000" pitchFamily="2" charset="2"/>
-              <a:buChar char="Ø"/>
-            </a:pPr>
-            <a:r>
-              <a:rPr lang="en-US" dirty="0"/>
-              <a:t>Conducted weekend working meetings</a:t>
-            </a:r>
-          </a:p>
-          <a:p>
-            <a:pPr lvl="1">
-              <a:buFont typeface="Courier New" panose="02070309020205020404" pitchFamily="49" charset="0"/>
-              <a:buChar char="o"/>
-            </a:pPr>
-            <a:r>
-              <a:rPr lang="en-US" dirty="0"/>
-              <a:t>Making a component (not just at the top App layer) a class and leveraging state, component Did Mount within it</a:t>
-            </a:r>
-            <a:endParaRPr lang="en-US" sz="2200" dirty="0"/>
-          </a:p>
-          <a:p>
             <a:pPr>
               <a:buFont typeface="Arial" panose="020B0604020202020204" pitchFamily="34" charset="0"/>
               <a:buChar char="•"/>
             </a:pPr>
-            <a:endParaRPr lang="en-US" dirty="0"/>
-          </a:p>
-          <a:p>
-            <a:pPr lvl="2">
-              <a:buFont typeface="Wingdings" panose="05000000000000000000" pitchFamily="2" charset="2"/>
-              <a:buChar char="Ø"/>
+            <a:r>
+              <a:rPr lang="en-US" sz="2000" dirty="0"/>
+              <a:t>Challenges</a:t>
+            </a:r>
+          </a:p>
+          <a:p>
+            <a:pPr lvl="1">
+              <a:buFont typeface="Arial" panose="020B0604020202020204" pitchFamily="34" charset="0"/>
+              <a:buChar char="•"/>
+            </a:pPr>
+            <a:r>
+              <a:rPr lang="en-US" dirty="0"/>
+              <a:t>Authentication for login page</a:t>
+            </a:r>
+          </a:p>
+          <a:p>
+            <a:pPr lvl="1">
+              <a:buFont typeface="Arial" panose="020B0604020202020204" pitchFamily="34" charset="0"/>
+              <a:buChar char="•"/>
+            </a:pPr>
+            <a:r>
+              <a:rPr lang="en-US" dirty="0"/>
+              <a:t>Seed data is needed for an array of objects to make sure React has something to render when it loads</a:t>
+            </a:r>
+          </a:p>
+          <a:p>
+            <a:pPr lvl="1">
+              <a:buFont typeface="Arial" panose="020B0604020202020204" pitchFamily="34" charset="0"/>
+              <a:buChar char="•"/>
+            </a:pPr>
+            <a:r>
+              <a:rPr lang="en-US" dirty="0"/>
+              <a:t>Parameter management in React</a:t>
+            </a:r>
+          </a:p>
+          <a:p>
+            <a:pPr lvl="1">
+              <a:buFont typeface="Arial" panose="020B0604020202020204" pitchFamily="34" charset="0"/>
+              <a:buChar char="•"/>
             </a:pPr>
             <a:endParaRPr lang="en-US" dirty="0"/>
           </a:p>
           <a:p>
-            <a:pPr lvl="1"/>
+            <a:pPr>
+              <a:buFont typeface="Arial" panose="020B0604020202020204" pitchFamily="34" charset="0"/>
+              <a:buChar char="•"/>
+            </a:pPr>
+            <a:r>
+              <a:rPr lang="en-US" sz="2000" dirty="0"/>
+              <a:t>Successes</a:t>
+            </a:r>
+          </a:p>
+          <a:p>
+            <a:pPr lvl="1">
+              <a:buFont typeface="Arial" panose="020B0604020202020204" pitchFamily="34" charset="0"/>
+              <a:buChar char="•"/>
+            </a:pPr>
+            <a:r>
+              <a:rPr lang="en-US" dirty="0"/>
+              <a:t>Great teamwork everyone contributed well </a:t>
+            </a:r>
+          </a:p>
+          <a:p>
+            <a:pPr lvl="1">
+              <a:buFont typeface="Arial" panose="020B0604020202020204" pitchFamily="34" charset="0"/>
+              <a:buChar char="•"/>
+            </a:pPr>
+            <a:r>
+              <a:rPr lang="en-US" dirty="0"/>
+              <a:t>Great communication</a:t>
+            </a:r>
+          </a:p>
+          <a:p>
+            <a:pPr lvl="1">
+              <a:buFont typeface="Arial" panose="020B0604020202020204" pitchFamily="34" charset="0"/>
+              <a:buChar char="•"/>
+            </a:pPr>
+            <a:r>
+              <a:rPr lang="en-US" dirty="0"/>
+              <a:t>Productive project meetings</a:t>
+            </a:r>
+          </a:p>
+          <a:p>
+            <a:pPr lvl="2">
+              <a:buFont typeface="Arial" panose="020B0604020202020204" pitchFamily="34" charset="0"/>
+              <a:buChar char="•"/>
+            </a:pPr>
+            <a:r>
+              <a:rPr lang="en-US" sz="2000" dirty="0"/>
+              <a:t>Scrum meeting earlier in the day, followed by a working meeting in the evening </a:t>
+            </a:r>
+          </a:p>
+          <a:p>
+            <a:pPr lvl="2">
+              <a:buFont typeface="Arial" panose="020B0604020202020204" pitchFamily="34" charset="0"/>
+              <a:buChar char="•"/>
+            </a:pPr>
+            <a:r>
+              <a:rPr lang="en-US" sz="2000" dirty="0"/>
+              <a:t>Conducted weekend working meetings</a:t>
+            </a:r>
+          </a:p>
+          <a:p>
+            <a:pPr lvl="1">
+              <a:buFont typeface="Arial" panose="020B0604020202020204" pitchFamily="34" charset="0"/>
+              <a:buChar char="•"/>
+            </a:pPr>
+            <a:r>
+              <a:rPr lang="en-US" dirty="0"/>
+              <a:t>Making a component (not just at the top App layer) a class and leveraging state, component Did Mount within it</a:t>
+            </a:r>
+          </a:p>
+          <a:p>
+            <a:pPr>
+              <a:buFont typeface="Arial" panose="020B0604020202020204" pitchFamily="34" charset="0"/>
+              <a:buChar char="•"/>
+            </a:pPr>
             <a:endParaRPr lang="en-US" sz="2000" dirty="0"/>
+          </a:p>
+          <a:p>
+            <a:pPr lvl="2">
+              <a:buFont typeface="Arial" panose="020B0604020202020204" pitchFamily="34" charset="0"/>
+              <a:buChar char="•"/>
+            </a:pPr>
+            <a:endParaRPr lang="en-US" sz="2000" dirty="0"/>
+          </a:p>
+          <a:p>
+            <a:pPr lvl="1">
+              <a:buFont typeface="Arial" panose="020B0604020202020204" pitchFamily="34" charset="0"/>
+              <a:buChar char="•"/>
+            </a:pPr>
+            <a:endParaRPr lang="en-US" dirty="0"/>
           </a:p>
         </p:txBody>
       </p:sp>
@@ -9283,8 +9395,8 @@
         </p:nvSpPr>
         <p:spPr>
           <a:xfrm>
-            <a:off x="1143000" y="2133600"/>
-            <a:ext cx="9829800" cy="3894667"/>
+            <a:off x="1142999" y="2133600"/>
+            <a:ext cx="10824411" cy="3894667"/>
           </a:xfrm>
         </p:spPr>
         <p:txBody>
@@ -9326,6 +9438,35 @@
               <a:rPr lang="en-US" dirty="0"/>
               <a:t>Enhanced permissions for change manager</a:t>
             </a:r>
+          </a:p>
+          <a:p>
+            <a:pPr lvl="1"/>
+            <a:r>
+              <a:rPr lang="en-US" dirty="0"/>
+              <a:t>In the reports section allow drilldown on individual tickets</a:t>
+            </a:r>
+          </a:p>
+          <a:p>
+            <a:pPr lvl="1"/>
+            <a:r>
+              <a:rPr lang="en-US" dirty="0"/>
+              <a:t>Allow drilldown on the dashboard charts to the changes associated for that day</a:t>
+            </a:r>
+          </a:p>
+          <a:p>
+            <a:pPr lvl="1"/>
+            <a:r>
+              <a:rPr lang="en-US" dirty="0"/>
+              <a:t>Allow sort on individual columns</a:t>
+            </a:r>
+          </a:p>
+          <a:p>
+            <a:pPr lvl="1"/>
+            <a:endParaRPr lang="en-US" dirty="0"/>
+          </a:p>
+          <a:p>
+            <a:pPr lvl="1"/>
+            <a:endParaRPr lang="en-US" dirty="0"/>
           </a:p>
           <a:p>
             <a:pPr lvl="1"/>

</xml_diff>